<commit_message>
add supplement, update analyses
</commit_message>
<xml_diff>
--- a/figures/adaptive_bot_overview.pptx
+++ b/figures/adaptive_bot_overview.pptx
@@ -464,7 +464,7 @@
           <a:p>
             <a:fld id="{1E71EFE8-6944-B847-B4E4-75DE26D2AB42}" type="datetimeFigureOut">
               <a:rPr lang="en-US" smtClean="0"/>
-              <a:t>5/16/23</a:t>
+              <a:t>2/8/24</a:t>
             </a:fld>
             <a:endParaRPr lang="en-US"/>
           </a:p>
@@ -634,7 +634,7 @@
           <a:p>
             <a:fld id="{1E71EFE8-6944-B847-B4E4-75DE26D2AB42}" type="datetimeFigureOut">
               <a:rPr lang="en-US" smtClean="0"/>
-              <a:t>5/16/23</a:t>
+              <a:t>2/8/24</a:t>
             </a:fld>
             <a:endParaRPr lang="en-US"/>
           </a:p>
@@ -814,7 +814,7 @@
           <a:p>
             <a:fld id="{1E71EFE8-6944-B847-B4E4-75DE26D2AB42}" type="datetimeFigureOut">
               <a:rPr lang="en-US" smtClean="0"/>
-              <a:t>5/16/23</a:t>
+              <a:t>2/8/24</a:t>
             </a:fld>
             <a:endParaRPr lang="en-US"/>
           </a:p>
@@ -984,7 +984,7 @@
           <a:p>
             <a:fld id="{1E71EFE8-6944-B847-B4E4-75DE26D2AB42}" type="datetimeFigureOut">
               <a:rPr lang="en-US" smtClean="0"/>
-              <a:t>5/16/23</a:t>
+              <a:t>2/8/24</a:t>
             </a:fld>
             <a:endParaRPr lang="en-US"/>
           </a:p>
@@ -1228,7 +1228,7 @@
           <a:p>
             <a:fld id="{1E71EFE8-6944-B847-B4E4-75DE26D2AB42}" type="datetimeFigureOut">
               <a:rPr lang="en-US" smtClean="0"/>
-              <a:t>5/16/23</a:t>
+              <a:t>2/8/24</a:t>
             </a:fld>
             <a:endParaRPr lang="en-US"/>
           </a:p>
@@ -1460,7 +1460,7 @@
           <a:p>
             <a:fld id="{1E71EFE8-6944-B847-B4E4-75DE26D2AB42}" type="datetimeFigureOut">
               <a:rPr lang="en-US" smtClean="0"/>
-              <a:t>5/16/23</a:t>
+              <a:t>2/8/24</a:t>
             </a:fld>
             <a:endParaRPr lang="en-US"/>
           </a:p>
@@ -1827,7 +1827,7 @@
           <a:p>
             <a:fld id="{1E71EFE8-6944-B847-B4E4-75DE26D2AB42}" type="datetimeFigureOut">
               <a:rPr lang="en-US" smtClean="0"/>
-              <a:t>5/16/23</a:t>
+              <a:t>2/8/24</a:t>
             </a:fld>
             <a:endParaRPr lang="en-US"/>
           </a:p>
@@ -1945,7 +1945,7 @@
           <a:p>
             <a:fld id="{1E71EFE8-6944-B847-B4E4-75DE26D2AB42}" type="datetimeFigureOut">
               <a:rPr lang="en-US" smtClean="0"/>
-              <a:t>5/16/23</a:t>
+              <a:t>2/8/24</a:t>
             </a:fld>
             <a:endParaRPr lang="en-US"/>
           </a:p>
@@ -2040,7 +2040,7 @@
           <a:p>
             <a:fld id="{1E71EFE8-6944-B847-B4E4-75DE26D2AB42}" type="datetimeFigureOut">
               <a:rPr lang="en-US" smtClean="0"/>
-              <a:t>5/16/23</a:t>
+              <a:t>2/8/24</a:t>
             </a:fld>
             <a:endParaRPr lang="en-US"/>
           </a:p>
@@ -2317,7 +2317,7 @@
           <a:p>
             <a:fld id="{1E71EFE8-6944-B847-B4E4-75DE26D2AB42}" type="datetimeFigureOut">
               <a:rPr lang="en-US" smtClean="0"/>
-              <a:t>5/16/23</a:t>
+              <a:t>2/8/24</a:t>
             </a:fld>
             <a:endParaRPr lang="en-US"/>
           </a:p>
@@ -2574,7 +2574,7 @@
           <a:p>
             <a:fld id="{1E71EFE8-6944-B847-B4E4-75DE26D2AB42}" type="datetimeFigureOut">
               <a:rPr lang="en-US" smtClean="0"/>
-              <a:t>5/16/23</a:t>
+              <a:t>2/8/24</a:t>
             </a:fld>
             <a:endParaRPr lang="en-US"/>
           </a:p>
@@ -2787,7 +2787,7 @@
           <a:p>
             <a:fld id="{1E71EFE8-6944-B847-B4E4-75DE26D2AB42}" type="datetimeFigureOut">
               <a:rPr lang="en-US" smtClean="0"/>
-              <a:t>5/16/23</a:t>
+              <a:t>2/8/24</a:t>
             </a:fld>
             <a:endParaRPr lang="en-US"/>
           </a:p>
@@ -8877,7 +8877,7 @@
         <p:spPr>
           <a:xfrm>
             <a:off x="168609" y="4841540"/>
-            <a:ext cx="2259233" cy="338554"/>
+            <a:ext cx="2380691" cy="338554"/>
           </a:xfrm>
           <a:prstGeom prst="rect">
             <a:avLst/>
@@ -8966,8 +8966,8 @@
         </p:nvSpPr>
         <p:spPr>
           <a:xfrm>
-            <a:off x="5280812" y="3495756"/>
-            <a:ext cx="1982383" cy="830997"/>
+            <a:off x="5546430" y="3495756"/>
+            <a:ext cx="1716765" cy="830997"/>
           </a:xfrm>
           <a:prstGeom prst="rect">
             <a:avLst/>
@@ -9013,7 +9013,7 @@
         </p:nvSpPr>
         <p:spPr>
           <a:xfrm>
-            <a:off x="492690" y="547104"/>
+            <a:off x="519194" y="547104"/>
             <a:ext cx="456568" cy="457200"/>
           </a:xfrm>
           <a:prstGeom prst="ellipse">
@@ -9067,7 +9067,7 @@
         </p:nvSpPr>
         <p:spPr>
           <a:xfrm rot="7587259">
-            <a:off x="378074" y="994415"/>
+            <a:off x="404578" y="994415"/>
             <a:ext cx="685800" cy="685800"/>
           </a:xfrm>
           <a:prstGeom prst="chord">
@@ -9124,7 +9124,7 @@
         </p:nvGrpSpPr>
         <p:grpSpPr>
           <a:xfrm>
-            <a:off x="321079" y="1996565"/>
+            <a:off x="374087" y="1996565"/>
             <a:ext cx="799791" cy="822960"/>
             <a:chOff x="28944" y="1042782"/>
             <a:chExt cx="1213569" cy="1248725"/>
@@ -10396,8 +10396,8 @@
         </p:nvSpPr>
         <p:spPr>
           <a:xfrm>
-            <a:off x="144534" y="1385866"/>
-            <a:ext cx="1152880" cy="338554"/>
+            <a:off x="90969" y="1399266"/>
+            <a:ext cx="1328857" cy="338554"/>
           </a:xfrm>
           <a:prstGeom prst="rect">
             <a:avLst/>
@@ -10405,7 +10405,7 @@
           <a:noFill/>
         </p:spPr>
         <p:txBody>
-          <a:bodyPr wrap="none" rtlCol="0">
+          <a:bodyPr wrap="square" rtlCol="0">
             <a:spAutoFit/>
           </a:bodyPr>
           <a:lstStyle/>
@@ -10437,8 +10437,8 @@
         </p:nvSpPr>
         <p:spPr>
           <a:xfrm>
-            <a:off x="11728" y="2810503"/>
-            <a:ext cx="1456058" cy="584775"/>
+            <a:off x="-14776" y="2810503"/>
+            <a:ext cx="1540348" cy="584775"/>
           </a:xfrm>
           <a:prstGeom prst="rect">
             <a:avLst/>
@@ -12269,7 +12269,7 @@
         </p:nvSpPr>
         <p:spPr>
           <a:xfrm>
-            <a:off x="10096500" y="3500111"/>
+            <a:off x="10109752" y="3513363"/>
             <a:ext cx="1961400" cy="584775"/>
           </a:xfrm>
           <a:prstGeom prst="rect">
@@ -12314,7 +12314,7 @@
         </p:nvSpPr>
         <p:spPr>
           <a:xfrm>
-            <a:off x="5030148" y="4854825"/>
+            <a:off x="5043400" y="4854825"/>
             <a:ext cx="1871966" cy="338554"/>
           </a:xfrm>
           <a:prstGeom prst="rect">
@@ -12359,8 +12359,8 @@
         </p:nvSpPr>
         <p:spPr>
           <a:xfrm>
-            <a:off x="396092" y="5384375"/>
-            <a:ext cx="2048891" cy="584775"/>
+            <a:off x="396091" y="5384375"/>
+            <a:ext cx="2153209" cy="584775"/>
           </a:xfrm>
           <a:prstGeom prst="rect">
             <a:avLst/>

</xml_diff>